<commit_message>
tidy up final versions
</commit_message>
<xml_diff>
--- a/content/resources/1-intro_Markov_model/Example-model.pptx
+++ b/content/resources/1-intro_Markov_model/Example-model.pptx
@@ -6,11 +6,9 @@
   </p:sldMasterIdLst>
   <p:sldIdLst>
     <p:sldId id="256" r:id="rId2"/>
-    <p:sldId id="258" r:id="rId3"/>
+    <p:sldId id="259" r:id="rId3"/>
     <p:sldId id="261" r:id="rId4"/>
-    <p:sldId id="257" r:id="rId5"/>
-    <p:sldId id="259" r:id="rId6"/>
-    <p:sldId id="260" r:id="rId7"/>
+    <p:sldId id="260" r:id="rId5"/>
   </p:sldIdLst>
   <p:sldSz cx="12192000" cy="6858000"/>
   <p:notesSz cx="6858000" cy="9144000"/>
@@ -266,7 +264,7 @@
           <a:p>
             <a:fld id="{1F3D7F03-4E26-481F-BF7A-0AFA9749C262}" type="datetimeFigureOut">
               <a:rPr lang="en-GB" smtClean="0"/>
-              <a:t>01/04/2022</a:t>
+              <a:t>02/08/2022</a:t>
             </a:fld>
             <a:endParaRPr lang="en-GB"/>
           </a:p>
@@ -466,7 +464,7 @@
           <a:p>
             <a:fld id="{1F3D7F03-4E26-481F-BF7A-0AFA9749C262}" type="datetimeFigureOut">
               <a:rPr lang="en-GB" smtClean="0"/>
-              <a:t>01/04/2022</a:t>
+              <a:t>02/08/2022</a:t>
             </a:fld>
             <a:endParaRPr lang="en-GB"/>
           </a:p>
@@ -676,7 +674,7 @@
           <a:p>
             <a:fld id="{1F3D7F03-4E26-481F-BF7A-0AFA9749C262}" type="datetimeFigureOut">
               <a:rPr lang="en-GB" smtClean="0"/>
-              <a:t>01/04/2022</a:t>
+              <a:t>02/08/2022</a:t>
             </a:fld>
             <a:endParaRPr lang="en-GB"/>
           </a:p>
@@ -876,7 +874,7 @@
           <a:p>
             <a:fld id="{1F3D7F03-4E26-481F-BF7A-0AFA9749C262}" type="datetimeFigureOut">
               <a:rPr lang="en-GB" smtClean="0"/>
-              <a:t>01/04/2022</a:t>
+              <a:t>02/08/2022</a:t>
             </a:fld>
             <a:endParaRPr lang="en-GB"/>
           </a:p>
@@ -1152,7 +1150,7 @@
           <a:p>
             <a:fld id="{1F3D7F03-4E26-481F-BF7A-0AFA9749C262}" type="datetimeFigureOut">
               <a:rPr lang="en-GB" smtClean="0"/>
-              <a:t>01/04/2022</a:t>
+              <a:t>02/08/2022</a:t>
             </a:fld>
             <a:endParaRPr lang="en-GB"/>
           </a:p>
@@ -1420,7 +1418,7 @@
           <a:p>
             <a:fld id="{1F3D7F03-4E26-481F-BF7A-0AFA9749C262}" type="datetimeFigureOut">
               <a:rPr lang="en-GB" smtClean="0"/>
-              <a:t>01/04/2022</a:t>
+              <a:t>02/08/2022</a:t>
             </a:fld>
             <a:endParaRPr lang="en-GB"/>
           </a:p>
@@ -1835,7 +1833,7 @@
           <a:p>
             <a:fld id="{1F3D7F03-4E26-481F-BF7A-0AFA9749C262}" type="datetimeFigureOut">
               <a:rPr lang="en-GB" smtClean="0"/>
-              <a:t>01/04/2022</a:t>
+              <a:t>02/08/2022</a:t>
             </a:fld>
             <a:endParaRPr lang="en-GB"/>
           </a:p>
@@ -1977,7 +1975,7 @@
           <a:p>
             <a:fld id="{1F3D7F03-4E26-481F-BF7A-0AFA9749C262}" type="datetimeFigureOut">
               <a:rPr lang="en-GB" smtClean="0"/>
-              <a:t>01/04/2022</a:t>
+              <a:t>02/08/2022</a:t>
             </a:fld>
             <a:endParaRPr lang="en-GB"/>
           </a:p>
@@ -2090,7 +2088,7 @@
           <a:p>
             <a:fld id="{1F3D7F03-4E26-481F-BF7A-0AFA9749C262}" type="datetimeFigureOut">
               <a:rPr lang="en-GB" smtClean="0"/>
-              <a:t>01/04/2022</a:t>
+              <a:t>02/08/2022</a:t>
             </a:fld>
             <a:endParaRPr lang="en-GB"/>
           </a:p>
@@ -2403,7 +2401,7 @@
           <a:p>
             <a:fld id="{1F3D7F03-4E26-481F-BF7A-0AFA9749C262}" type="datetimeFigureOut">
               <a:rPr lang="en-GB" smtClean="0"/>
-              <a:t>01/04/2022</a:t>
+              <a:t>02/08/2022</a:t>
             </a:fld>
             <a:endParaRPr lang="en-GB"/>
           </a:p>
@@ -2692,7 +2690,7 @@
           <a:p>
             <a:fld id="{1F3D7F03-4E26-481F-BF7A-0AFA9749C262}" type="datetimeFigureOut">
               <a:rPr lang="en-GB" smtClean="0"/>
-              <a:t>01/04/2022</a:t>
+              <a:t>02/08/2022</a:t>
             </a:fld>
             <a:endParaRPr lang="en-GB"/>
           </a:p>
@@ -2935,7 +2933,7 @@
           <a:p>
             <a:fld id="{1F3D7F03-4E26-481F-BF7A-0AFA9749C262}" type="datetimeFigureOut">
               <a:rPr lang="en-GB" smtClean="0"/>
-              <a:t>01/04/2022</a:t>
+              <a:t>02/08/2022</a:t>
             </a:fld>
             <a:endParaRPr lang="en-GB"/>
           </a:p>
@@ -3439,63 +3437,116 @@
           <a:chExt cx="0" cy="0"/>
         </a:xfrm>
       </p:grpSpPr>
-      <p:sp>
-        <p:nvSpPr>
-          <p:cNvPr id="2" name="Title 1">
-            <a:extLst>
-              <a:ext uri="{FF2B5EF4-FFF2-40B4-BE49-F238E27FC236}">
-                <a16:creationId xmlns:a16="http://schemas.microsoft.com/office/drawing/2014/main" id="{B492E54C-5BF8-4C2C-8904-1A68603C3AB5}"/>
-              </a:ext>
-            </a:extLst>
-          </p:cNvPr>
-          <p:cNvSpPr>
-            <a:spLocks noGrp="1"/>
-          </p:cNvSpPr>
-          <p:nvPr>
-            <p:ph type="title"/>
-          </p:nvPr>
-        </p:nvSpPr>
-        <p:spPr/>
-        <p:txBody>
-          <a:bodyPr/>
-          <a:lstStyle/>
-          <a:p>
-            <a:r>
-              <a:rPr lang="en-GB" dirty="0"/>
-              <a:t>Background</a:t>
-            </a:r>
-          </a:p>
-        </p:txBody>
-      </p:sp>
-      <p:sp>
-        <p:nvSpPr>
-          <p:cNvPr id="3" name="Content Placeholder 2">
-            <a:extLst>
-              <a:ext uri="{FF2B5EF4-FFF2-40B4-BE49-F238E27FC236}">
-                <a16:creationId xmlns:a16="http://schemas.microsoft.com/office/drawing/2014/main" id="{E4B7F4E8-2F7B-400D-9EE0-75C6464D6786}"/>
-              </a:ext>
-            </a:extLst>
-          </p:cNvPr>
-          <p:cNvSpPr>
-            <a:spLocks noGrp="1"/>
-          </p:cNvSpPr>
-          <p:nvPr>
-            <p:ph idx="1"/>
-          </p:nvPr>
-        </p:nvSpPr>
-        <p:spPr/>
-        <p:txBody>
-          <a:bodyPr/>
-          <a:lstStyle/>
-          <a:p>
-            <a:endParaRPr lang="en-GB"/>
-          </a:p>
-        </p:txBody>
-      </p:sp>
+      <p:pic>
+        <p:nvPicPr>
+          <p:cNvPr id="5" name="Picture 4"/>
+          <p:cNvPicPr>
+            <a:picLocks noChangeAspect="1"/>
+          </p:cNvPicPr>
+          <p:nvPr/>
+        </p:nvPicPr>
+        <p:blipFill>
+          <a:blip r:embed="rId2"/>
+          <a:stretch>
+            <a:fillRect/>
+          </a:stretch>
+        </p:blipFill>
+        <p:spPr>
+          <a:xfrm>
+            <a:off x="6257108" y="305887"/>
+            <a:ext cx="4402183" cy="6236426"/>
+          </a:xfrm>
+          <a:prstGeom prst="rect">
+            <a:avLst/>
+          </a:prstGeom>
+          <a:solidFill>
+            <a:srgbClr val="FFFFFF">
+              <a:shade val="85000"/>
+            </a:srgbClr>
+          </a:solidFill>
+          <a:ln w="190500" cap="rnd">
+            <a:solidFill>
+              <a:srgbClr val="FFFFFF"/>
+            </a:solidFill>
+          </a:ln>
+          <a:effectLst>
+            <a:outerShdw blurRad="50000" algn="tl" rotWithShape="0">
+              <a:srgbClr val="000000">
+                <a:alpha val="41000"/>
+              </a:srgbClr>
+            </a:outerShdw>
+          </a:effectLst>
+          <a:scene3d>
+            <a:camera prst="orthographicFront"/>
+            <a:lightRig rig="twoPt" dir="t">
+              <a:rot lat="0" lon="0" rev="7800000"/>
+            </a:lightRig>
+          </a:scene3d>
+          <a:sp3d contourW="6350">
+            <a:bevelT w="50800" h="16510"/>
+            <a:contourClr>
+              <a:srgbClr val="C0C0C0"/>
+            </a:contourClr>
+          </a:sp3d>
+        </p:spPr>
+      </p:pic>
+      <p:pic>
+        <p:nvPicPr>
+          <p:cNvPr id="4" name="Picture 3"/>
+          <p:cNvPicPr>
+            <a:picLocks noChangeAspect="1"/>
+          </p:cNvPicPr>
+          <p:nvPr/>
+        </p:nvPicPr>
+        <p:blipFill>
+          <a:blip r:embed="rId3"/>
+          <a:stretch>
+            <a:fillRect/>
+          </a:stretch>
+        </p:blipFill>
+        <p:spPr>
+          <a:xfrm>
+            <a:off x="1112520" y="391885"/>
+            <a:ext cx="4259657" cy="6020487"/>
+          </a:xfrm>
+          <a:prstGeom prst="rect">
+            <a:avLst/>
+          </a:prstGeom>
+          <a:solidFill>
+            <a:srgbClr val="FFFFFF">
+              <a:shade val="85000"/>
+            </a:srgbClr>
+          </a:solidFill>
+          <a:ln w="190500" cap="rnd">
+            <a:solidFill>
+              <a:srgbClr val="FFFFFF"/>
+            </a:solidFill>
+          </a:ln>
+          <a:effectLst>
+            <a:outerShdw blurRad="50000" algn="tl" rotWithShape="0">
+              <a:srgbClr val="000000">
+                <a:alpha val="41000"/>
+              </a:srgbClr>
+            </a:outerShdw>
+          </a:effectLst>
+          <a:scene3d>
+            <a:camera prst="orthographicFront"/>
+            <a:lightRig rig="twoPt" dir="t">
+              <a:rot lat="0" lon="0" rev="7800000"/>
+            </a:lightRig>
+          </a:scene3d>
+          <a:sp3d contourW="6350">
+            <a:bevelT w="50800" h="16510"/>
+            <a:contourClr>
+              <a:srgbClr val="C0C0C0"/>
+            </a:contourClr>
+          </a:sp3d>
+        </p:spPr>
+      </p:pic>
     </p:spTree>
     <p:extLst>
       <p:ext uri="{BB962C8B-B14F-4D97-AF65-F5344CB8AC3E}">
-        <p14:creationId xmlns:p14="http://schemas.microsoft.com/office/powerpoint/2010/main" val="1175764776"/>
+        <p14:creationId xmlns:p14="http://schemas.microsoft.com/office/powerpoint/2010/main" val="1182930730"/>
       </p:ext>
     </p:extLst>
   </p:cSld>
@@ -3543,7 +3594,11 @@
           <a:bodyPr/>
           <a:lstStyle/>
           <a:p>
-            <a:endParaRPr lang="en-GB"/>
+            <a:r>
+              <a:rPr lang="en-GB" dirty="0" smtClean="0"/>
+              <a:t>Markov model</a:t>
+            </a:r>
+            <a:endParaRPr lang="en-GB" dirty="0"/>
           </a:p>
         </p:txBody>
       </p:sp>
@@ -3617,7 +3672,7 @@
           <p:cNvPr id="2" name="Title 1">
             <a:extLst>
               <a:ext uri="{FF2B5EF4-FFF2-40B4-BE49-F238E27FC236}">
-                <a16:creationId xmlns:a16="http://schemas.microsoft.com/office/drawing/2014/main" id="{B23C1D91-974E-4EBF-928F-A7CABCCB4801}"/>
+                <a16:creationId xmlns:a16="http://schemas.microsoft.com/office/drawing/2014/main" id="{CFD9559F-6216-475C-B7FD-E817EA6024BC}"/>
               </a:ext>
             </a:extLst>
           </p:cNvPr>
@@ -3633,7 +3688,7 @@
           <a:bodyPr/>
           <a:lstStyle/>
           <a:p>
-            <a:endParaRPr lang="en-GB" dirty="0"/>
+            <a:endParaRPr lang="en-GB"/>
           </a:p>
         </p:txBody>
       </p:sp>
@@ -3642,7 +3697,7 @@
           <p:cNvPr id="3" name="Content Placeholder 2">
             <a:extLst>
               <a:ext uri="{FF2B5EF4-FFF2-40B4-BE49-F238E27FC236}">
-                <a16:creationId xmlns:a16="http://schemas.microsoft.com/office/drawing/2014/main" id="{437950BF-0F1A-4C73-873B-BC694F7417FC}"/>
+                <a16:creationId xmlns:a16="http://schemas.microsoft.com/office/drawing/2014/main" id="{4516DE05-24EB-43E3-B0AA-E471AF040170}"/>
               </a:ext>
             </a:extLst>
           </p:cNvPr>
@@ -3658,206 +3713,34 @@
           <a:bodyPr/>
           <a:lstStyle/>
           <a:p>
-            <a:r>
-              <a:rPr lang="en-GB" dirty="0"/>
-              <a:t>Briggs A, </a:t>
-            </a:r>
-            <a:r>
-              <a:rPr lang="en-GB" dirty="0" err="1"/>
-              <a:t>Sculpher</a:t>
-            </a:r>
-            <a:r>
-              <a:rPr lang="en-GB" dirty="0"/>
-              <a:t> M. Introducing Markov models for economic evaluation. </a:t>
-            </a:r>
-            <a:r>
-              <a:rPr lang="en-GB" dirty="0" err="1"/>
-              <a:t>PharmacoEconomics</a:t>
-            </a:r>
-            <a:r>
-              <a:rPr lang="en-GB" dirty="0"/>
-              <a:t> 1998; 13(4): 397-409.</a:t>
-            </a:r>
-          </a:p>
-          <a:p>
-            <a:endParaRPr lang="en-GB" dirty="0"/>
-          </a:p>
-          <a:p>
-            <a:r>
-              <a:rPr lang="en-GB" dirty="0"/>
-              <a:t>Briggs AH. Handling uncertainty in cost-effectiveness models. </a:t>
-            </a:r>
-            <a:r>
-              <a:rPr lang="en-GB" dirty="0" err="1"/>
-              <a:t>PharmacoEconomics</a:t>
-            </a:r>
-            <a:r>
-              <a:rPr lang="en-GB" dirty="0"/>
-              <a:t> 2000 May;17(5):479-500.</a:t>
-            </a:r>
-          </a:p>
-        </p:txBody>
-      </p:sp>
-    </p:spTree>
-    <p:extLst>
-      <p:ext uri="{BB962C8B-B14F-4D97-AF65-F5344CB8AC3E}">
-        <p14:creationId xmlns:p14="http://schemas.microsoft.com/office/powerpoint/2010/main" val="3355596950"/>
-      </p:ext>
-    </p:extLst>
-  </p:cSld>
-  <p:clrMapOvr>
-    <a:masterClrMapping/>
-  </p:clrMapOvr>
-</p:sld>
-</file>
-
-<file path=ppt/slides/slide5.xml><?xml version="1.0" encoding="utf-8"?>
-<p:sld xmlns:a="http://schemas.openxmlformats.org/drawingml/2006/main" xmlns:r="http://schemas.openxmlformats.org/officeDocument/2006/relationships" xmlns:p="http://schemas.openxmlformats.org/presentationml/2006/main">
-  <p:cSld>
-    <p:spTree>
-      <p:nvGrpSpPr>
-        <p:cNvPr id="1" name=""/>
-        <p:cNvGrpSpPr/>
-        <p:nvPr/>
-      </p:nvGrpSpPr>
-      <p:grpSpPr>
-        <a:xfrm>
-          <a:off x="0" y="0"/>
-          <a:ext cx="0" cy="0"/>
-          <a:chOff x="0" y="0"/>
-          <a:chExt cx="0" cy="0"/>
-        </a:xfrm>
-      </p:grpSpPr>
-      <p:sp>
-        <p:nvSpPr>
-          <p:cNvPr id="2" name="Title 1">
-            <a:extLst>
-              <a:ext uri="{FF2B5EF4-FFF2-40B4-BE49-F238E27FC236}">
-                <a16:creationId xmlns:a16="http://schemas.microsoft.com/office/drawing/2014/main" id="{4901630A-1240-4FCE-9D7D-D27772DD6341}"/>
-              </a:ext>
-            </a:extLst>
-          </p:cNvPr>
-          <p:cNvSpPr>
-            <a:spLocks noGrp="1"/>
-          </p:cNvSpPr>
-          <p:nvPr>
-            <p:ph type="title"/>
-          </p:nvPr>
-        </p:nvSpPr>
-        <p:spPr/>
-        <p:txBody>
-          <a:bodyPr/>
-          <a:lstStyle/>
-          <a:p>
-            <a:endParaRPr lang="en-GB"/>
-          </a:p>
-        </p:txBody>
-      </p:sp>
-      <p:sp>
-        <p:nvSpPr>
-          <p:cNvPr id="3" name="Content Placeholder 2">
-            <a:extLst>
-              <a:ext uri="{FF2B5EF4-FFF2-40B4-BE49-F238E27FC236}">
-                <a16:creationId xmlns:a16="http://schemas.microsoft.com/office/drawing/2014/main" id="{B121B355-07A1-4031-B127-F817ACC674D2}"/>
-              </a:ext>
-            </a:extLst>
-          </p:cNvPr>
-          <p:cNvSpPr>
-            <a:spLocks noGrp="1"/>
-          </p:cNvSpPr>
-          <p:nvPr>
-            <p:ph idx="1"/>
-          </p:nvPr>
-        </p:nvSpPr>
-        <p:spPr/>
-        <p:txBody>
-          <a:bodyPr/>
-          <a:lstStyle/>
-          <a:p>
-            <a:endParaRPr lang="en-GB"/>
-          </a:p>
-        </p:txBody>
-      </p:sp>
-    </p:spTree>
-    <p:extLst>
-      <p:ext uri="{BB962C8B-B14F-4D97-AF65-F5344CB8AC3E}">
-        <p14:creationId xmlns:p14="http://schemas.microsoft.com/office/powerpoint/2010/main" val="1182930730"/>
-      </p:ext>
-    </p:extLst>
-  </p:cSld>
-  <p:clrMapOvr>
-    <a:masterClrMapping/>
-  </p:clrMapOvr>
-</p:sld>
-</file>
-
-<file path=ppt/slides/slide6.xml><?xml version="1.0" encoding="utf-8"?>
-<p:sld xmlns:a="http://schemas.openxmlformats.org/drawingml/2006/main" xmlns:r="http://schemas.openxmlformats.org/officeDocument/2006/relationships" xmlns:p="http://schemas.openxmlformats.org/presentationml/2006/main">
-  <p:cSld>
-    <p:spTree>
-      <p:nvGrpSpPr>
-        <p:cNvPr id="1" name=""/>
-        <p:cNvGrpSpPr/>
-        <p:nvPr/>
-      </p:nvGrpSpPr>
-      <p:grpSpPr>
-        <a:xfrm>
-          <a:off x="0" y="0"/>
-          <a:ext cx="0" cy="0"/>
-          <a:chOff x="0" y="0"/>
-          <a:chExt cx="0" cy="0"/>
-        </a:xfrm>
-      </p:grpSpPr>
-      <p:sp>
-        <p:nvSpPr>
-          <p:cNvPr id="2" name="Title 1">
-            <a:extLst>
-              <a:ext uri="{FF2B5EF4-FFF2-40B4-BE49-F238E27FC236}">
-                <a16:creationId xmlns:a16="http://schemas.microsoft.com/office/drawing/2014/main" id="{CFD9559F-6216-475C-B7FD-E817EA6024BC}"/>
-              </a:ext>
-            </a:extLst>
-          </p:cNvPr>
-          <p:cNvSpPr>
-            <a:spLocks noGrp="1"/>
-          </p:cNvSpPr>
-          <p:nvPr>
-            <p:ph type="title"/>
-          </p:nvPr>
-        </p:nvSpPr>
-        <p:spPr/>
-        <p:txBody>
-          <a:bodyPr/>
-          <a:lstStyle/>
-          <a:p>
-            <a:endParaRPr lang="en-GB"/>
-          </a:p>
-        </p:txBody>
-      </p:sp>
-      <p:sp>
-        <p:nvSpPr>
-          <p:cNvPr id="3" name="Content Placeholder 2">
-            <a:extLst>
-              <a:ext uri="{FF2B5EF4-FFF2-40B4-BE49-F238E27FC236}">
-                <a16:creationId xmlns:a16="http://schemas.microsoft.com/office/drawing/2014/main" id="{4516DE05-24EB-43E3-B0AA-E471AF040170}"/>
-              </a:ext>
-            </a:extLst>
-          </p:cNvPr>
-          <p:cNvSpPr>
-            <a:spLocks noGrp="1"/>
-          </p:cNvSpPr>
-          <p:nvPr>
-            <p:ph idx="1"/>
-          </p:nvPr>
-        </p:nvSpPr>
-        <p:spPr/>
-        <p:txBody>
-          <a:bodyPr/>
-          <a:lstStyle/>
-          <a:p>
-            <a:endParaRPr lang="en-GB"/>
-          </a:p>
-        </p:txBody>
-      </p:sp>
+            <a:endParaRPr lang="en-GB"/>
+          </a:p>
+        </p:txBody>
+      </p:sp>
+      <p:pic>
+        <p:nvPicPr>
+          <p:cNvPr id="4" name="Picture 3"/>
+          <p:cNvPicPr>
+            <a:picLocks noChangeAspect="1"/>
+          </p:cNvPicPr>
+          <p:nvPr/>
+        </p:nvPicPr>
+        <p:blipFill>
+          <a:blip r:embed="rId2"/>
+          <a:stretch>
+            <a:fillRect/>
+          </a:stretch>
+        </p:blipFill>
+        <p:spPr>
+          <a:xfrm>
+            <a:off x="214312" y="191151"/>
+            <a:ext cx="11763375" cy="6338100"/>
+          </a:xfrm>
+          <a:prstGeom prst="rect">
+            <a:avLst/>
+          </a:prstGeom>
+        </p:spPr>
+      </p:pic>
     </p:spTree>
     <p:extLst>
       <p:ext uri="{BB962C8B-B14F-4D97-AF65-F5344CB8AC3E}">

</xml_diff>